<commit_message>
created media for readme
</commit_message>
<xml_diff>
--- a/assets/images/Sandbox.pptx
+++ b/assets/images/Sandbox.pptx
@@ -6,6 +6,7 @@
   </p:sldMasterIdLst>
   <p:sldIdLst>
     <p:sldId id="256" r:id="rId2"/>
+    <p:sldId id="257" r:id="rId3"/>
   </p:sldIdLst>
   <p:sldSz cx="12192000" cy="6858000"/>
   <p:notesSz cx="6858000" cy="9144000"/>
@@ -104,7 +105,49 @@
       </a:defRPr>
     </a:lvl9pPr>
   </p:defaultTextStyle>
+  <p:extLst>
+    <p:ext uri="{EFAFB233-063F-42B5-8137-9DF3F51BA10A}">
+      <p15:sldGuideLst xmlns:p15="http://schemas.microsoft.com/office/powerpoint/2012/main"/>
+    </p:ext>
+  </p:extLst>
 </p:presentation>
+</file>
+
+<file path=ppt/changesInfos/changesInfo1.xml><?xml version="1.0" encoding="utf-8"?>
+<pc:chgInfo xmlns:a="http://schemas.openxmlformats.org/drawingml/2006/main" xmlns:r="http://schemas.openxmlformats.org/officeDocument/2006/relationships" xmlns:ac="http://schemas.microsoft.com/office/drawing/2013/main/command" xmlns:pc="http://schemas.microsoft.com/office/powerpoint/2013/main/command">
+  <pc:docChgLst>
+    <pc:chgData name="Ballard Ingram" userId="0bf532af960122f7" providerId="LiveId" clId="{CA588855-FA32-40D1-8A0B-8625048E1E04}"/>
+    <pc:docChg chg="custSel addSld modSld">
+      <pc:chgData name="Ballard Ingram" userId="0bf532af960122f7" providerId="LiveId" clId="{CA588855-FA32-40D1-8A0B-8625048E1E04}" dt="2022-03-05T13:18:27.741" v="2" actId="478"/>
+      <pc:docMkLst>
+        <pc:docMk/>
+      </pc:docMkLst>
+      <pc:sldChg chg="delSp new mod">
+        <pc:chgData name="Ballard Ingram" userId="0bf532af960122f7" providerId="LiveId" clId="{CA588855-FA32-40D1-8A0B-8625048E1E04}" dt="2022-03-05T13:18:27.741" v="2" actId="478"/>
+        <pc:sldMkLst>
+          <pc:docMk/>
+          <pc:sldMk cId="1937600270" sldId="257"/>
+        </pc:sldMkLst>
+        <pc:spChg chg="del">
+          <ac:chgData name="Ballard Ingram" userId="0bf532af960122f7" providerId="LiveId" clId="{CA588855-FA32-40D1-8A0B-8625048E1E04}" dt="2022-03-05T13:18:27.473" v="1" actId="478"/>
+          <ac:spMkLst>
+            <pc:docMk/>
+            <pc:sldMk cId="1937600270" sldId="257"/>
+            <ac:spMk id="2" creationId="{24A30B51-A8C9-4BEB-BF51-B1CC114159BD}"/>
+          </ac:spMkLst>
+        </pc:spChg>
+        <pc:spChg chg="del">
+          <ac:chgData name="Ballard Ingram" userId="0bf532af960122f7" providerId="LiveId" clId="{CA588855-FA32-40D1-8A0B-8625048E1E04}" dt="2022-03-05T13:18:27.741" v="2" actId="478"/>
+          <ac:spMkLst>
+            <pc:docMk/>
+            <pc:sldMk cId="1937600270" sldId="257"/>
+            <ac:spMk id="3" creationId="{EBEE3E9D-F1D8-41AF-A548-B732F2D39AB1}"/>
+          </ac:spMkLst>
+        </pc:spChg>
+      </pc:sldChg>
+    </pc:docChg>
+  </pc:docChgLst>
+</pc:chgInfo>
 </file>
 
 <file path=ppt/slideLayouts/slideLayout1.xml><?xml version="1.0" encoding="utf-8"?>
@@ -3492,6 +3535,36 @@
 </p:sld>
 </file>
 
+<file path=ppt/slides/slide2.xml><?xml version="1.0" encoding="utf-8"?>
+<p:sld xmlns:a="http://schemas.openxmlformats.org/drawingml/2006/main" xmlns:r="http://schemas.openxmlformats.org/officeDocument/2006/relationships" xmlns:p="http://schemas.openxmlformats.org/presentationml/2006/main">
+  <p:cSld>
+    <p:spTree>
+      <p:nvGrpSpPr>
+        <p:cNvPr id="1" name=""/>
+        <p:cNvGrpSpPr/>
+        <p:nvPr/>
+      </p:nvGrpSpPr>
+      <p:grpSpPr>
+        <a:xfrm>
+          <a:off x="0" y="0"/>
+          <a:ext cx="0" cy="0"/>
+          <a:chOff x="0" y="0"/>
+          <a:chExt cx="0" cy="0"/>
+        </a:xfrm>
+      </p:grpSpPr>
+    </p:spTree>
+    <p:extLst>
+      <p:ext uri="{BB962C8B-B14F-4D97-AF65-F5344CB8AC3E}">
+        <p14:creationId xmlns:p14="http://schemas.microsoft.com/office/powerpoint/2010/main" val="1937600270"/>
+      </p:ext>
+    </p:extLst>
+  </p:cSld>
+  <p:clrMapOvr>
+    <a:masterClrMapping/>
+  </p:clrMapOvr>
+</p:sld>
+</file>
+
 <file path=ppt/theme/theme1.xml><?xml version="1.0" encoding="utf-8"?>
 <a:theme xmlns:a="http://schemas.openxmlformats.org/drawingml/2006/main" name="Office Theme">
   <a:themeElements>

</xml_diff>